<commit_message>
updates with prf working on current channel!
</commit_message>
<xml_diff>
--- a/e101_neural_recording_2/2023.07.17_neural_recording.pptx
+++ b/e101_neural_recording_2/2023.07.17_neural_recording.pptx
@@ -3775,7 +3775,7 @@
             </a:pPr>
             <a:r>
               <a:rPr lang="en-GB" dirty="0"/>
-              <a:t>   - measure the carrier frequency, and the difference frequency with respect to frequency. </a:t>
+              <a:t>   - measure the carrier frequency amplitude, and the difference frequency with respect to that frequency if using the dual sine wave pressure output. </a:t>
             </a:r>
           </a:p>
         </p:txBody>
@@ -3840,7 +3840,7 @@
           <a:p>
             <a:r>
               <a:rPr lang="en-GB" sz="3200" dirty="0"/>
-              <a:t>Is 4Hz coming out of the RF monitor? </a:t>
+              <a:t>Is 4Hz coming out of the RF monitor at all? </a:t>
             </a:r>
           </a:p>
         </p:txBody>
@@ -3885,15 +3885,7 @@
           <a:p>
             <a:r>
               <a:rPr lang="en-GB" dirty="0"/>
-              <a:t>Alternatively, place a high pass filter at the output of the RF amplifier and repeat the MEP experiment? (the E&amp;I 240L spec sheet says it is 10kHz -12MHz range). What is the amplitude at the stim frequency(it may have diminished slight due to </a:t>
-            </a:r>
-            <a:r>
-              <a:rPr lang="en-GB"/>
-              <a:t>the filter)? </a:t>
-            </a:r>
-            <a:r>
-              <a:rPr lang="en-GB" dirty="0"/>
-              <a:t>Do I still see MEPS at the difference frequency? </a:t>
+              <a:t>(in vivo) Alternatively, place a high pass filter at the output of the RF amplifier and repeat the MEP experiment? (the E&amp;I 240L spec sheet says it is 10kHz -12MHz range). What is the amplitude at the stim frequency(it may have diminished slight due to the filter)? Do I still see MEPS at the difference frequency? </a:t>
             </a:r>
           </a:p>
         </p:txBody>

</xml_diff>